<commit_message>
refresh the link flow from core engine point of view
</commit_message>
<xml_diff>
--- a/VEEPortingGuide/images/mjvm_flow2.pptx
+++ b/VEEPortingGuide/images/mjvm_flow2.pptx
@@ -261,7 +261,7 @@
           <a:p>
             <a:fld id="{8382ADF2-3FF2-4FB4-8A07-AE359359CF4F}" type="datetimeFigureOut">
               <a:rPr lang="en-GB" smtClean="0"/>
-              <a:t>01/04/2020</a:t>
+              <a:t>14/12/2023</a:t>
             </a:fld>
             <a:endParaRPr lang="en-GB"/>
           </a:p>
@@ -461,7 +461,7 @@
           <a:p>
             <a:fld id="{8382ADF2-3FF2-4FB4-8A07-AE359359CF4F}" type="datetimeFigureOut">
               <a:rPr lang="en-GB" smtClean="0"/>
-              <a:t>01/04/2020</a:t>
+              <a:t>14/12/2023</a:t>
             </a:fld>
             <a:endParaRPr lang="en-GB"/>
           </a:p>
@@ -671,7 +671,7 @@
           <a:p>
             <a:fld id="{8382ADF2-3FF2-4FB4-8A07-AE359359CF4F}" type="datetimeFigureOut">
               <a:rPr lang="en-GB" smtClean="0"/>
-              <a:t>01/04/2020</a:t>
+              <a:t>14/12/2023</a:t>
             </a:fld>
             <a:endParaRPr lang="en-GB"/>
           </a:p>
@@ -871,7 +871,7 @@
           <a:p>
             <a:fld id="{8382ADF2-3FF2-4FB4-8A07-AE359359CF4F}" type="datetimeFigureOut">
               <a:rPr lang="en-GB" smtClean="0"/>
-              <a:t>01/04/2020</a:t>
+              <a:t>14/12/2023</a:t>
             </a:fld>
             <a:endParaRPr lang="en-GB"/>
           </a:p>
@@ -1147,7 +1147,7 @@
           <a:p>
             <a:fld id="{8382ADF2-3FF2-4FB4-8A07-AE359359CF4F}" type="datetimeFigureOut">
               <a:rPr lang="en-GB" smtClean="0"/>
-              <a:t>01/04/2020</a:t>
+              <a:t>14/12/2023</a:t>
             </a:fld>
             <a:endParaRPr lang="en-GB"/>
           </a:p>
@@ -1415,7 +1415,7 @@
           <a:p>
             <a:fld id="{8382ADF2-3FF2-4FB4-8A07-AE359359CF4F}" type="datetimeFigureOut">
               <a:rPr lang="en-GB" smtClean="0"/>
-              <a:t>01/04/2020</a:t>
+              <a:t>14/12/2023</a:t>
             </a:fld>
             <a:endParaRPr lang="en-GB"/>
           </a:p>
@@ -1830,7 +1830,7 @@
           <a:p>
             <a:fld id="{8382ADF2-3FF2-4FB4-8A07-AE359359CF4F}" type="datetimeFigureOut">
               <a:rPr lang="en-GB" smtClean="0"/>
-              <a:t>01/04/2020</a:t>
+              <a:t>14/12/2023</a:t>
             </a:fld>
             <a:endParaRPr lang="en-GB"/>
           </a:p>
@@ -1972,7 +1972,7 @@
           <a:p>
             <a:fld id="{8382ADF2-3FF2-4FB4-8A07-AE359359CF4F}" type="datetimeFigureOut">
               <a:rPr lang="en-GB" smtClean="0"/>
-              <a:t>01/04/2020</a:t>
+              <a:t>14/12/2023</a:t>
             </a:fld>
             <a:endParaRPr lang="en-GB"/>
           </a:p>
@@ -2085,7 +2085,7 @@
           <a:p>
             <a:fld id="{8382ADF2-3FF2-4FB4-8A07-AE359359CF4F}" type="datetimeFigureOut">
               <a:rPr lang="en-GB" smtClean="0"/>
-              <a:t>01/04/2020</a:t>
+              <a:t>14/12/2023</a:t>
             </a:fld>
             <a:endParaRPr lang="en-GB"/>
           </a:p>
@@ -2398,7 +2398,7 @@
           <a:p>
             <a:fld id="{8382ADF2-3FF2-4FB4-8A07-AE359359CF4F}" type="datetimeFigureOut">
               <a:rPr lang="en-GB" smtClean="0"/>
-              <a:t>01/04/2020</a:t>
+              <a:t>14/12/2023</a:t>
             </a:fld>
             <a:endParaRPr lang="en-GB"/>
           </a:p>
@@ -2687,7 +2687,7 @@
           <a:p>
             <a:fld id="{8382ADF2-3FF2-4FB4-8A07-AE359359CF4F}" type="datetimeFigureOut">
               <a:rPr lang="en-GB" smtClean="0"/>
-              <a:t>01/04/2020</a:t>
+              <a:t>14/12/2023</a:t>
             </a:fld>
             <a:endParaRPr lang="en-GB"/>
           </a:p>
@@ -2930,7 +2930,7 @@
           <a:p>
             <a:fld id="{8382ADF2-3FF2-4FB4-8A07-AE359359CF4F}" type="datetimeFigureOut">
               <a:rPr lang="en-GB" smtClean="0"/>
-              <a:t>01/04/2020</a:t>
+              <a:t>14/12/2023</a:t>
             </a:fld>
             <a:endParaRPr lang="en-GB"/>
           </a:p>
@@ -3363,8 +3363,8 @@
         </p:nvCxnSpPr>
         <p:spPr>
           <a:xfrm flipH="1">
-            <a:off x="3129915" y="2631530"/>
-            <a:ext cx="6445216" cy="0"/>
+            <a:off x="4449718" y="2572657"/>
+            <a:ext cx="5040511" cy="39834"/>
           </a:xfrm>
           <a:prstGeom prst="line">
             <a:avLst/>
@@ -3381,10 +3381,10 @@
       </p:cxnSp>
       <p:sp>
         <p:nvSpPr>
-          <p:cNvPr id="7" name="Rounded Rectangle 107">
-            <a:extLst>
-              <a:ext uri="{FF2B5EF4-FFF2-40B4-BE49-F238E27FC236}">
-                <a16:creationId xmlns:a16="http://schemas.microsoft.com/office/drawing/2014/main" id="{B93FB0D9-9560-44E7-AFF0-0DB92B907652}"/>
+          <p:cNvPr id="8" name="Rounded Rectangle 107">
+            <a:extLst>
+              <a:ext uri="{FF2B5EF4-FFF2-40B4-BE49-F238E27FC236}">
+                <a16:creationId xmlns:a16="http://schemas.microsoft.com/office/drawing/2014/main" id="{88E43890-43DA-4C12-A073-3EF5E441FB5A}"/>
               </a:ext>
             </a:extLst>
           </p:cNvPr>
@@ -3393,7 +3393,7 @@
         </p:nvSpPr>
         <p:spPr>
           <a:xfrm>
-            <a:off x="6233649" y="919603"/>
+            <a:off x="6233649" y="2840953"/>
             <a:ext cx="1364364" cy="720000"/>
           </a:xfrm>
           <a:prstGeom prst="roundRect">
@@ -3436,7 +3436,7 @@
               <a:defRPr/>
             </a:pPr>
             <a:r>
-              <a:rPr lang="en-US" sz="1200" b="1" kern="0" dirty="0" err="1">
+              <a:rPr lang="en-US" sz="1200" b="1" kern="0" dirty="0">
                 <a:solidFill>
                   <a:srgbClr val="FFFFFF"/>
                 </a:solidFill>
@@ -3444,36 +3444,87 @@
                 <a:ea typeface="Source Sans Pro Light" charset="0"/>
                 <a:cs typeface="Source Sans Pro Light" charset="0"/>
               </a:rPr>
-              <a:t>MicroEJ</a:t>
-            </a:r>
-            <a:r>
-              <a:rPr lang="en-US" sz="1200" b="1" kern="0">
+              <a:t>Application library file</a:t>
+            </a:r>
+          </a:p>
+          <a:p>
+            <a:pPr marL="0" marR="0" lvl="0" indent="0" algn="ctr" defTabSz="914377" eaLnBrk="1" fontAlgn="auto" latinLnBrk="0" hangingPunct="1">
+              <a:lnSpc>
+                <a:spcPct val="100000"/>
+              </a:lnSpc>
+              <a:spcBef>
+                <a:spcPts val="0"/>
+              </a:spcBef>
+              <a:spcAft>
+                <a:spcPts val="0"/>
+              </a:spcAft>
+              <a:buClrTx/>
+              <a:buSzTx/>
+              <a:buFontTx/>
+              <a:buNone/>
+              <a:tabLst/>
+              <a:defRPr/>
+            </a:pPr>
+            <a:r>
+              <a:rPr kumimoji="0" lang="en-US" sz="1200" b="1" u="none" strike="noStrike" kern="0" cap="none" spc="0" normalizeH="0" baseline="0" noProof="0" dirty="0">
+                <a:ln>
+                  <a:noFill/>
+                </a:ln>
                 <a:solidFill>
                   <a:srgbClr val="FFFFFF"/>
                 </a:solidFill>
+                <a:effectLst/>
+                <a:uLnTx/>
+                <a:uFillTx/>
                 <a:latin typeface="Source Sans Pro Light" charset="0"/>
                 <a:ea typeface="Source Sans Pro Light" charset="0"/>
                 <a:cs typeface="Source Sans Pro Light" charset="0"/>
               </a:rPr>
-              <a:t> Platform</a:t>
-            </a:r>
-            <a:endParaRPr lang="en-US" sz="1200" b="1" kern="0" dirty="0">
-              <a:solidFill>
-                <a:srgbClr val="FFFFFF"/>
-              </a:solidFill>
-              <a:latin typeface="Source Sans Pro Light" charset="0"/>
-              <a:ea typeface="Source Sans Pro Light" charset="0"/>
-              <a:cs typeface="Source Sans Pro Light" charset="0"/>
-            </a:endParaRPr>
-          </a:p>
-        </p:txBody>
-      </p:sp>
-      <p:sp>
-        <p:nvSpPr>
-          <p:cNvPr id="8" name="Rounded Rectangle 107">
-            <a:extLst>
-              <a:ext uri="{FF2B5EF4-FFF2-40B4-BE49-F238E27FC236}">
-                <a16:creationId xmlns:a16="http://schemas.microsoft.com/office/drawing/2014/main" id="{88E43890-43DA-4C12-A073-3EF5E441FB5A}"/>
+              <a:t>(</a:t>
+            </a:r>
+            <a:r>
+              <a:rPr kumimoji="0" lang="en-US" sz="1200" b="1" u="none" strike="noStrike" kern="0" cap="none" spc="0" normalizeH="0" baseline="0" noProof="0" dirty="0" err="1">
+                <a:ln>
+                  <a:noFill/>
+                </a:ln>
+                <a:solidFill>
+                  <a:srgbClr val="FFFFFF"/>
+                </a:solidFill>
+                <a:effectLst/>
+                <a:uLnTx/>
+                <a:uFillTx/>
+                <a:latin typeface="Source Sans Pro Light" charset="0"/>
+                <a:ea typeface="Source Sans Pro Light" charset="0"/>
+                <a:cs typeface="Source Sans Pro Light" charset="0"/>
+              </a:rPr>
+              <a:t>microejapp.o</a:t>
+            </a:r>
+            <a:r>
+              <a:rPr kumimoji="0" lang="en-US" sz="1200" b="1" u="none" strike="noStrike" kern="0" cap="none" spc="0" normalizeH="0" baseline="0" noProof="0" dirty="0">
+                <a:ln>
+                  <a:noFill/>
+                </a:ln>
+                <a:solidFill>
+                  <a:srgbClr val="FFFFFF"/>
+                </a:solidFill>
+                <a:effectLst/>
+                <a:uLnTx/>
+                <a:uFillTx/>
+                <a:latin typeface="Source Sans Pro Light" charset="0"/>
+                <a:ea typeface="Source Sans Pro Light" charset="0"/>
+                <a:cs typeface="Source Sans Pro Light" charset="0"/>
+              </a:rPr>
+              <a:t>)</a:t>
+            </a:r>
+          </a:p>
+        </p:txBody>
+      </p:sp>
+      <p:sp>
+        <p:nvSpPr>
+          <p:cNvPr id="9" name="Rounded Rectangle 107">
+            <a:extLst>
+              <a:ext uri="{FF2B5EF4-FFF2-40B4-BE49-F238E27FC236}">
+                <a16:creationId xmlns:a16="http://schemas.microsoft.com/office/drawing/2014/main" id="{D1DD3A6A-D878-491A-98F6-981AB16D0E24}"/>
               </a:ext>
             </a:extLst>
           </p:cNvPr>
@@ -3482,7 +3533,7 @@
         </p:nvSpPr>
         <p:spPr>
           <a:xfrm>
-            <a:off x="6233649" y="2832075"/>
+            <a:off x="4449718" y="2840953"/>
             <a:ext cx="1364364" cy="720000"/>
           </a:xfrm>
           <a:prstGeom prst="roundRect">
@@ -3533,87 +3584,31 @@
                 <a:ea typeface="Source Sans Pro Light" charset="0"/>
                 <a:cs typeface="Source Sans Pro Light" charset="0"/>
               </a:rPr>
-              <a:t>Application library file</a:t>
-            </a:r>
-          </a:p>
-          <a:p>
-            <a:pPr marL="0" marR="0" lvl="0" indent="0" algn="ctr" defTabSz="914377" eaLnBrk="1" fontAlgn="auto" latinLnBrk="0" hangingPunct="1">
-              <a:lnSpc>
-                <a:spcPct val="100000"/>
-              </a:lnSpc>
-              <a:spcBef>
-                <a:spcPts val="0"/>
-              </a:spcBef>
-              <a:spcAft>
-                <a:spcPts val="0"/>
-              </a:spcAft>
-              <a:buClrTx/>
-              <a:buSzTx/>
-              <a:buFontTx/>
-              <a:buNone/>
-              <a:tabLst/>
-              <a:defRPr/>
-            </a:pPr>
-            <a:r>
-              <a:rPr kumimoji="0" lang="en-US" sz="1200" b="1" u="none" strike="noStrike" kern="0" cap="none" spc="0" normalizeH="0" baseline="0" noProof="0" dirty="0">
-                <a:ln>
-                  <a:noFill/>
-                </a:ln>
-                <a:solidFill>
-                  <a:srgbClr val="FFFFFF"/>
-                </a:solidFill>
-                <a:effectLst/>
-                <a:uLnTx/>
-                <a:uFillTx/>
-                <a:latin typeface="Source Sans Pro Light" charset="0"/>
-                <a:ea typeface="Source Sans Pro Light" charset="0"/>
-                <a:cs typeface="Source Sans Pro Light" charset="0"/>
-              </a:rPr>
-              <a:t>(</a:t>
-            </a:r>
-            <a:r>
-              <a:rPr kumimoji="0" lang="en-US" sz="1200" b="1" u="none" strike="noStrike" kern="0" cap="none" spc="0" normalizeH="0" baseline="0" noProof="0" dirty="0" err="1">
-                <a:ln>
-                  <a:noFill/>
-                </a:ln>
-                <a:solidFill>
-                  <a:srgbClr val="FFFFFF"/>
-                </a:solidFill>
-                <a:effectLst/>
-                <a:uLnTx/>
-                <a:uFillTx/>
-                <a:latin typeface="Source Sans Pro Light" charset="0"/>
-                <a:ea typeface="Source Sans Pro Light" charset="0"/>
-                <a:cs typeface="Source Sans Pro Light" charset="0"/>
-              </a:rPr>
-              <a:t>microejapp.o</a:t>
-            </a:r>
-            <a:r>
-              <a:rPr kumimoji="0" lang="en-US" sz="1200" b="1" u="none" strike="noStrike" kern="0" cap="none" spc="0" normalizeH="0" baseline="0" noProof="0" dirty="0">
-                <a:ln>
-                  <a:noFill/>
-                </a:ln>
-                <a:solidFill>
-                  <a:srgbClr val="FFFFFF"/>
-                </a:solidFill>
-                <a:effectLst/>
-                <a:uLnTx/>
-                <a:uFillTx/>
-                <a:latin typeface="Source Sans Pro Light" charset="0"/>
-                <a:ea typeface="Source Sans Pro Light" charset="0"/>
-                <a:cs typeface="Source Sans Pro Light" charset="0"/>
-              </a:rPr>
-              <a:t>)</a:t>
-            </a:r>
-          </a:p>
-        </p:txBody>
-      </p:sp>
-      <p:sp>
-        <p:nvSpPr>
-          <p:cNvPr id="9" name="Rounded Rectangle 107">
-            <a:extLst>
-              <a:ext uri="{FF2B5EF4-FFF2-40B4-BE49-F238E27FC236}">
-                <a16:creationId xmlns:a16="http://schemas.microsoft.com/office/drawing/2014/main" id="{D1DD3A6A-D878-491A-98F6-981AB16D0E24}"/>
+              <a:t> Abstraction Layers Implementations</a:t>
+            </a:r>
+            <a:endParaRPr kumimoji="0" lang="en-US" sz="1200" b="1" u="none" strike="noStrike" kern="0" cap="none" spc="0" normalizeH="0" baseline="0" noProof="0" dirty="0">
+              <a:ln>
+                <a:noFill/>
+              </a:ln>
+              <a:solidFill>
+                <a:srgbClr val="FFFFFF"/>
+              </a:solidFill>
+              <a:effectLst/>
+              <a:uLnTx/>
+              <a:uFillTx/>
+              <a:latin typeface="Source Sans Pro Light" charset="0"/>
+              <a:ea typeface="Source Sans Pro Light" charset="0"/>
+              <a:cs typeface="Source Sans Pro Light" charset="0"/>
+            </a:endParaRPr>
+          </a:p>
+        </p:txBody>
+      </p:sp>
+      <p:sp>
+        <p:nvSpPr>
+          <p:cNvPr id="10" name="Rounded Rectangle 107">
+            <a:extLst>
+              <a:ext uri="{FF2B5EF4-FFF2-40B4-BE49-F238E27FC236}">
+                <a16:creationId xmlns:a16="http://schemas.microsoft.com/office/drawing/2014/main" id="{6248785A-FF5D-4080-BDE9-A282CD57B81B}"/>
               </a:ext>
             </a:extLst>
           </p:cNvPr>
@@ -3622,7 +3617,7 @@
         </p:nvSpPr>
         <p:spPr>
           <a:xfrm>
-            <a:off x="4449718" y="2832075"/>
+            <a:off x="6233577" y="830062"/>
             <a:ext cx="1364364" cy="720000"/>
           </a:xfrm>
           <a:prstGeom prst="roundRect">
@@ -3673,7 +3668,67 @@
                 <a:ea typeface="Source Sans Pro Light" charset="0"/>
                 <a:cs typeface="Source Sans Pro Light" charset="0"/>
               </a:rPr>
-              <a:t>C application code and Board Support Package</a:t>
+              <a:t>Application </a:t>
+            </a:r>
+          </a:p>
+          <a:p>
+            <a:pPr marL="0" marR="0" lvl="0" indent="0" algn="ctr" defTabSz="914377" eaLnBrk="1" fontAlgn="auto" latinLnBrk="0" hangingPunct="1">
+              <a:lnSpc>
+                <a:spcPct val="100000"/>
+              </a:lnSpc>
+              <a:spcBef>
+                <a:spcPts val="0"/>
+              </a:spcBef>
+              <a:spcAft>
+                <a:spcPts val="0"/>
+              </a:spcAft>
+              <a:buClrTx/>
+              <a:buSzTx/>
+              <a:buFontTx/>
+              <a:buNone/>
+              <a:tabLst/>
+              <a:defRPr/>
+            </a:pPr>
+            <a:r>
+              <a:rPr lang="en-US" sz="1200" b="1" kern="0" dirty="0">
+                <a:solidFill>
+                  <a:srgbClr val="FFFFFF"/>
+                </a:solidFill>
+                <a:latin typeface="Source Sans Pro Light" charset="0"/>
+                <a:ea typeface="Source Sans Pro Light" charset="0"/>
+                <a:cs typeface="Source Sans Pro Light" charset="0"/>
+              </a:rPr>
+              <a:t>&amp; </a:t>
+            </a:r>
+          </a:p>
+          <a:p>
+            <a:pPr marL="0" marR="0" lvl="0" indent="0" algn="ctr" defTabSz="914377" eaLnBrk="1" fontAlgn="auto" latinLnBrk="0" hangingPunct="1">
+              <a:lnSpc>
+                <a:spcPct val="100000"/>
+              </a:lnSpc>
+              <a:spcBef>
+                <a:spcPts val="0"/>
+              </a:spcBef>
+              <a:spcAft>
+                <a:spcPts val="0"/>
+              </a:spcAft>
+              <a:buClrTx/>
+              <a:buSzTx/>
+              <a:buFontTx/>
+              <a:buNone/>
+              <a:tabLst/>
+              <a:defRPr/>
+            </a:pPr>
+            <a:r>
+              <a:rPr lang="en-US" sz="1200" b="1" kern="0" dirty="0">
+                <a:solidFill>
+                  <a:srgbClr val="FFFFFF"/>
+                </a:solidFill>
+                <a:latin typeface="Source Sans Pro Light" charset="0"/>
+                <a:ea typeface="Source Sans Pro Light" charset="0"/>
+                <a:cs typeface="Source Sans Pro Light" charset="0"/>
+              </a:rPr>
+              <a:t>Libraries</a:t>
             </a:r>
             <a:endParaRPr kumimoji="0" lang="en-US" sz="1200" b="1" u="none" strike="noStrike" kern="0" cap="none" spc="0" normalizeH="0" baseline="0" noProof="0" dirty="0">
               <a:ln>
@@ -3694,10 +3749,10 @@
       </p:sp>
       <p:sp>
         <p:nvSpPr>
-          <p:cNvPr id="10" name="Rounded Rectangle 107">
-            <a:extLst>
-              <a:ext uri="{FF2B5EF4-FFF2-40B4-BE49-F238E27FC236}">
-                <a16:creationId xmlns:a16="http://schemas.microsoft.com/office/drawing/2014/main" id="{6248785A-FF5D-4080-BDE9-A282CD57B81B}"/>
+          <p:cNvPr id="11" name="Rounded Rectangle 107">
+            <a:extLst>
+              <a:ext uri="{FF2B5EF4-FFF2-40B4-BE49-F238E27FC236}">
+                <a16:creationId xmlns:a16="http://schemas.microsoft.com/office/drawing/2014/main" id="{71C1FDF4-E691-475C-99F0-E3BAFB950210}"/>
               </a:ext>
             </a:extLst>
           </p:cNvPr>
@@ -3706,7 +3761,7 @@
         </p:nvSpPr>
         <p:spPr>
           <a:xfrm>
-            <a:off x="4449718" y="919603"/>
+            <a:off x="6233577" y="4751407"/>
             <a:ext cx="1364364" cy="720000"/>
           </a:xfrm>
           <a:prstGeom prst="roundRect">
@@ -3749,6 +3804,47 @@
               <a:defRPr/>
             </a:pPr>
             <a:r>
+              <a:rPr lang="en-US" sz="1200" b="1" kern="0" dirty="0">
+                <a:solidFill>
+                  <a:srgbClr val="FFFFFF"/>
+                </a:solidFill>
+                <a:latin typeface="Source Sans Pro Light" charset="0"/>
+                <a:ea typeface="Source Sans Pro Light" charset="0"/>
+                <a:cs typeface="Source Sans Pro Light" charset="0"/>
+              </a:rPr>
+              <a:t>ELF Executable</a:t>
+            </a:r>
+          </a:p>
+          <a:p>
+            <a:pPr marL="0" marR="0" lvl="0" indent="0" algn="ctr" defTabSz="914377" eaLnBrk="1" fontAlgn="auto" latinLnBrk="0" hangingPunct="1">
+              <a:lnSpc>
+                <a:spcPct val="100000"/>
+              </a:lnSpc>
+              <a:spcBef>
+                <a:spcPts val="0"/>
+              </a:spcBef>
+              <a:spcAft>
+                <a:spcPts val="0"/>
+              </a:spcAft>
+              <a:buClrTx/>
+              <a:buSzTx/>
+              <a:buFontTx/>
+              <a:buNone/>
+              <a:tabLst/>
+              <a:defRPr/>
+            </a:pPr>
+            <a:r>
+              <a:rPr lang="en-US" sz="1200" b="1" kern="0" dirty="0">
+                <a:solidFill>
+                  <a:srgbClr val="FFFFFF"/>
+                </a:solidFill>
+                <a:latin typeface="Source Sans Pro Light" charset="0"/>
+                <a:ea typeface="Source Sans Pro Light" charset="0"/>
+                <a:cs typeface="Source Sans Pro Light" charset="0"/>
+              </a:rPr>
+              <a:t>(</a:t>
+            </a:r>
+            <a:r>
               <a:rPr lang="en-US" sz="1200" b="1" kern="0" dirty="0" err="1">
                 <a:solidFill>
                   <a:srgbClr val="FFFFFF"/>
@@ -3757,7 +3853,7 @@
                 <a:ea typeface="Source Sans Pro Light" charset="0"/>
                 <a:cs typeface="Source Sans Pro Light" charset="0"/>
               </a:rPr>
-              <a:t>MicroEJ</a:t>
+              <a:t>application.out</a:t>
             </a:r>
             <a:r>
               <a:rPr lang="en-US" sz="1200" b="1" kern="0" dirty="0">
@@ -3768,7 +3864,7 @@
                 <a:ea typeface="Source Sans Pro Light" charset="0"/>
                 <a:cs typeface="Source Sans Pro Light" charset="0"/>
               </a:rPr>
-              <a:t> Application code</a:t>
+              <a:t>)</a:t>
             </a:r>
             <a:endParaRPr kumimoji="0" lang="en-US" sz="1200" b="1" u="none" strike="noStrike" kern="0" cap="none" spc="0" normalizeH="0" baseline="0" noProof="0" dirty="0">
               <a:ln>
@@ -3789,10 +3885,10 @@
       </p:sp>
       <p:sp>
         <p:nvSpPr>
-          <p:cNvPr id="11" name="Rounded Rectangle 107">
-            <a:extLst>
-              <a:ext uri="{FF2B5EF4-FFF2-40B4-BE49-F238E27FC236}">
-                <a16:creationId xmlns:a16="http://schemas.microsoft.com/office/drawing/2014/main" id="{71C1FDF4-E691-475C-99F0-E3BAFB950210}"/>
+          <p:cNvPr id="12" name="Rounded Rectangle 107">
+            <a:extLst>
+              <a:ext uri="{FF2B5EF4-FFF2-40B4-BE49-F238E27FC236}">
+                <a16:creationId xmlns:a16="http://schemas.microsoft.com/office/drawing/2014/main" id="{CE5B311E-7366-4841-8BFF-26C1CBE33996}"/>
               </a:ext>
             </a:extLst>
           </p:cNvPr>
@@ -3801,7 +3897,7 @@
         </p:nvSpPr>
         <p:spPr>
           <a:xfrm>
-            <a:off x="6233577" y="4742529"/>
+            <a:off x="8017580" y="2840951"/>
             <a:ext cx="1364364" cy="720000"/>
           </a:xfrm>
           <a:prstGeom prst="roundRect">
@@ -3821,7 +3917,7 @@
           <a:effectLst/>
         </p:spPr>
         <p:txBody>
-          <a:bodyPr wrap="square" tIns="36000" bIns="36000" rtlCol="0" anchor="ctr">
+          <a:bodyPr wrap="square" lIns="54000" tIns="36000" rIns="54000" bIns="36000" rtlCol="0" anchor="ctr">
             <a:noAutofit/>
           </a:bodyPr>
           <a:lstStyle/>
@@ -3852,7 +3948,59 @@
                 <a:ea typeface="Source Sans Pro Light" charset="0"/>
                 <a:cs typeface="Source Sans Pro Light" charset="0"/>
               </a:rPr>
-              <a:t>Executable application</a:t>
+              <a:t>Core Engine </a:t>
+            </a:r>
+          </a:p>
+          <a:p>
+            <a:pPr marL="0" marR="0" lvl="0" indent="0" algn="ctr" defTabSz="914377" eaLnBrk="1" fontAlgn="auto" latinLnBrk="0" hangingPunct="1">
+              <a:lnSpc>
+                <a:spcPct val="100000"/>
+              </a:lnSpc>
+              <a:spcBef>
+                <a:spcPts val="0"/>
+              </a:spcBef>
+              <a:spcAft>
+                <a:spcPts val="0"/>
+              </a:spcAft>
+              <a:buClrTx/>
+              <a:buSzTx/>
+              <a:buFontTx/>
+              <a:buNone/>
+              <a:tabLst/>
+              <a:defRPr/>
+            </a:pPr>
+            <a:r>
+              <a:rPr lang="en-US" sz="1200" b="1" kern="0" dirty="0">
+                <a:solidFill>
+                  <a:srgbClr val="FFFFFF"/>
+                </a:solidFill>
+                <a:latin typeface="Source Sans Pro Light" charset="0"/>
+                <a:ea typeface="Source Sans Pro Light" charset="0"/>
+                <a:cs typeface="Source Sans Pro Light" charset="0"/>
+              </a:rPr>
+              <a:t>library file (</a:t>
+            </a:r>
+            <a:r>
+              <a:rPr lang="en-US" sz="1200" b="1" kern="0" dirty="0" err="1">
+                <a:solidFill>
+                  <a:srgbClr val="FFFFFF"/>
+                </a:solidFill>
+                <a:latin typeface="Source Sans Pro Light" charset="0"/>
+                <a:ea typeface="Source Sans Pro Light" charset="0"/>
+                <a:cs typeface="Source Sans Pro Light" charset="0"/>
+              </a:rPr>
+              <a:t>microejruntime.a</a:t>
+            </a:r>
+            <a:r>
+              <a:rPr lang="en-US" sz="1200" b="1" kern="0" dirty="0">
+                <a:solidFill>
+                  <a:srgbClr val="FFFFFF"/>
+                </a:solidFill>
+                <a:latin typeface="Source Sans Pro Light" charset="0"/>
+                <a:ea typeface="Source Sans Pro Light" charset="0"/>
+                <a:cs typeface="Source Sans Pro Light" charset="0"/>
+              </a:rPr>
+              <a:t>)</a:t>
             </a:r>
             <a:endParaRPr kumimoji="0" lang="en-US" sz="1200" b="1" u="none" strike="noStrike" kern="0" cap="none" spc="0" normalizeH="0" baseline="0" noProof="0" dirty="0">
               <a:ln>
@@ -3873,10 +4021,10 @@
       </p:sp>
       <p:sp>
         <p:nvSpPr>
-          <p:cNvPr id="12" name="Rounded Rectangle 107">
-            <a:extLst>
-              <a:ext uri="{FF2B5EF4-FFF2-40B4-BE49-F238E27FC236}">
-                <a16:creationId xmlns:a16="http://schemas.microsoft.com/office/drawing/2014/main" id="{CE5B311E-7366-4841-8BFF-26C1CBE33996}"/>
+          <p:cNvPr id="16" name="Rounded Rectangle 167">
+            <a:extLst>
+              <a:ext uri="{FF2B5EF4-FFF2-40B4-BE49-F238E27FC236}">
+                <a16:creationId xmlns:a16="http://schemas.microsoft.com/office/drawing/2014/main" id="{F7F6D3E3-CB5A-4C36-93EB-132FA7A0C0A3}"/>
               </a:ext>
             </a:extLst>
           </p:cNvPr>
@@ -3885,113 +4033,7 @@
         </p:nvSpPr>
         <p:spPr>
           <a:xfrm>
-            <a:off x="8017580" y="2832073"/>
-            <a:ext cx="1364364" cy="720000"/>
-          </a:xfrm>
-          <a:prstGeom prst="roundRect">
-            <a:avLst>
-              <a:gd name="adj" fmla="val 19644"/>
-            </a:avLst>
-          </a:prstGeom>
-          <a:solidFill>
-            <a:srgbClr val="CBD3D7">
-              <a:lumMod val="50000"/>
-            </a:srgbClr>
-          </a:solidFill>
-          <a:ln w="12700" cap="flat" cmpd="sng" algn="ctr">
-            <a:noFill/>
-            <a:prstDash val="solid"/>
-          </a:ln>
-          <a:effectLst/>
-        </p:spPr>
-        <p:txBody>
-          <a:bodyPr wrap="square" lIns="54000" tIns="36000" rIns="54000" bIns="36000" rtlCol="0" anchor="ctr">
-            <a:noAutofit/>
-          </a:bodyPr>
-          <a:lstStyle/>
-          <a:p>
-            <a:pPr marL="0" marR="0" lvl="0" indent="0" algn="ctr" defTabSz="914377" eaLnBrk="1" fontAlgn="auto" latinLnBrk="0" hangingPunct="1">
-              <a:lnSpc>
-                <a:spcPct val="100000"/>
-              </a:lnSpc>
-              <a:spcBef>
-                <a:spcPts val="0"/>
-              </a:spcBef>
-              <a:spcAft>
-                <a:spcPts val="0"/>
-              </a:spcAft>
-              <a:buClrTx/>
-              <a:buSzTx/>
-              <a:buFontTx/>
-              <a:buNone/>
-              <a:tabLst/>
-              <a:defRPr/>
-            </a:pPr>
-            <a:r>
-              <a:rPr lang="en-US" sz="1200" b="1" kern="0" dirty="0">
-                <a:solidFill>
-                  <a:srgbClr val="FFFFFF"/>
-                </a:solidFill>
-                <a:latin typeface="Source Sans Pro Light" charset="0"/>
-                <a:ea typeface="Source Sans Pro Light" charset="0"/>
-                <a:cs typeface="Source Sans Pro Light" charset="0"/>
-              </a:rPr>
-              <a:t>Architecture library file (</a:t>
-            </a:r>
-            <a:r>
-              <a:rPr lang="en-US" sz="1200" b="1" kern="0" dirty="0" err="1">
-                <a:solidFill>
-                  <a:srgbClr val="FFFFFF"/>
-                </a:solidFill>
-                <a:latin typeface="Source Sans Pro Light" charset="0"/>
-                <a:ea typeface="Source Sans Pro Light" charset="0"/>
-                <a:cs typeface="Source Sans Pro Light" charset="0"/>
-              </a:rPr>
-              <a:t>microejruntime.a</a:t>
-            </a:r>
-            <a:r>
-              <a:rPr lang="en-US" sz="1200" b="1" kern="0" dirty="0">
-                <a:solidFill>
-                  <a:srgbClr val="FFFFFF"/>
-                </a:solidFill>
-                <a:latin typeface="Source Sans Pro Light" charset="0"/>
-                <a:ea typeface="Source Sans Pro Light" charset="0"/>
-                <a:cs typeface="Source Sans Pro Light" charset="0"/>
-              </a:rPr>
-              <a:t>)</a:t>
-            </a:r>
-            <a:endParaRPr kumimoji="0" lang="en-US" sz="1200" b="1" u="none" strike="noStrike" kern="0" cap="none" spc="0" normalizeH="0" baseline="0" noProof="0" dirty="0">
-              <a:ln>
-                <a:noFill/>
-              </a:ln>
-              <a:solidFill>
-                <a:srgbClr val="FFFFFF"/>
-              </a:solidFill>
-              <a:effectLst/>
-              <a:uLnTx/>
-              <a:uFillTx/>
-              <a:latin typeface="Source Sans Pro Light" charset="0"/>
-              <a:ea typeface="Source Sans Pro Light" charset="0"/>
-              <a:cs typeface="Source Sans Pro Light" charset="0"/>
-            </a:endParaRPr>
-          </a:p>
-        </p:txBody>
-      </p:sp>
-      <p:sp>
-        <p:nvSpPr>
-          <p:cNvPr id="16" name="Rounded Rectangle 167">
-            <a:extLst>
-              <a:ext uri="{FF2B5EF4-FFF2-40B4-BE49-F238E27FC236}">
-                <a16:creationId xmlns:a16="http://schemas.microsoft.com/office/drawing/2014/main" id="{F7F6D3E3-CB5A-4C36-93EB-132FA7A0C0A3}"/>
-              </a:ext>
-            </a:extLst>
-          </p:cNvPr>
-          <p:cNvSpPr/>
-          <p:nvPr/>
-        </p:nvSpPr>
-        <p:spPr>
-          <a:xfrm>
-            <a:off x="6104339" y="2004357"/>
+            <a:off x="6104339" y="1939778"/>
             <a:ext cx="1622983" cy="462963"/>
           </a:xfrm>
           <a:prstGeom prst="roundRect">
@@ -4050,41 +4092,7 @@
                 <a:ea typeface="Source Sans Pro Light" charset="0"/>
                 <a:cs typeface="Source Sans Pro Light" charset="0"/>
               </a:rPr>
-              <a:t>Build the </a:t>
-            </a:r>
-            <a:r>
-              <a:rPr kumimoji="0" lang="en-US" sz="1100" b="0" u="none" strike="noStrike" kern="0" cap="none" spc="0" normalizeH="0" baseline="0" noProof="0" dirty="0" err="1">
-                <a:ln>
-                  <a:noFill/>
-                </a:ln>
-                <a:solidFill>
-                  <a:srgbClr val="4B5357"/>
-                </a:solidFill>
-                <a:effectLst/>
-                <a:uLnTx/>
-                <a:uFillTx/>
-                <a:latin typeface="Source Sans Pro Light" charset="0"/>
-                <a:ea typeface="Source Sans Pro Light" charset="0"/>
-                <a:cs typeface="Source Sans Pro Light" charset="0"/>
-              </a:rPr>
-              <a:t>MicroEJ</a:t>
-            </a:r>
-            <a:r>
-              <a:rPr kumimoji="0" lang="en-US" sz="1100" b="0" u="none" strike="noStrike" kern="0" cap="none" spc="0" normalizeH="0" baseline="0" noProof="0" dirty="0">
-                <a:ln>
-                  <a:noFill/>
-                </a:ln>
-                <a:solidFill>
-                  <a:srgbClr val="4B5357"/>
-                </a:solidFill>
-                <a:effectLst/>
-                <a:uLnTx/>
-                <a:uFillTx/>
-                <a:latin typeface="Source Sans Pro Light" charset="0"/>
-                <a:ea typeface="Source Sans Pro Light" charset="0"/>
-                <a:cs typeface="Source Sans Pro Light" charset="0"/>
-              </a:rPr>
-              <a:t> Application</a:t>
+              <a:t>Build the Application (SOAR)</a:t>
             </a:r>
           </a:p>
         </p:txBody>
@@ -4103,7 +4111,7 @@
         </p:nvSpPr>
         <p:spPr>
           <a:xfrm>
-            <a:off x="6104339" y="3913636"/>
+            <a:off x="6104339" y="3922514"/>
             <a:ext cx="1622983" cy="462963"/>
           </a:xfrm>
           <a:prstGeom prst="roundRect">
@@ -4162,8 +4170,52 @@
                 <a:ea typeface="Source Sans Pro Light" charset="0"/>
                 <a:cs typeface="Source Sans Pro Light" charset="0"/>
               </a:rPr>
-              <a:t>Build and link the full application</a:t>
-            </a:r>
+              <a:t>Build the full application</a:t>
+            </a:r>
+          </a:p>
+          <a:p>
+            <a:pPr marL="0" marR="0" lvl="0" indent="0" algn="ctr" defTabSz="914377" eaLnBrk="1" fontAlgn="auto" latinLnBrk="0" hangingPunct="1">
+              <a:lnSpc>
+                <a:spcPct val="100000"/>
+              </a:lnSpc>
+              <a:spcBef>
+                <a:spcPts val="0"/>
+              </a:spcBef>
+              <a:spcAft>
+                <a:spcPts val="0"/>
+              </a:spcAft>
+              <a:buClrTx/>
+              <a:buSzTx/>
+              <a:buFontTx/>
+              <a:buNone/>
+              <a:tabLst/>
+              <a:defRPr/>
+            </a:pPr>
+            <a:r>
+              <a:rPr lang="en-US" sz="1100" kern="0" dirty="0">
+                <a:solidFill>
+                  <a:srgbClr val="4B5357"/>
+                </a:solidFill>
+                <a:latin typeface="Source Sans Pro Light" charset="0"/>
+                <a:ea typeface="Source Sans Pro Light" charset="0"/>
+                <a:cs typeface="Source Sans Pro Light" charset="0"/>
+              </a:rPr>
+              <a:t>(Third Party Linker)</a:t>
+            </a:r>
+            <a:endParaRPr kumimoji="0" lang="en-US" sz="1100" b="0" u="none" strike="noStrike" kern="0" cap="none" spc="0" normalizeH="0" baseline="0" noProof="0" dirty="0">
+              <a:ln>
+                <a:noFill/>
+              </a:ln>
+              <a:solidFill>
+                <a:srgbClr val="4B5357"/>
+              </a:solidFill>
+              <a:effectLst/>
+              <a:uLnTx/>
+              <a:uFillTx/>
+              <a:latin typeface="Source Sans Pro Light" charset="0"/>
+              <a:ea typeface="Source Sans Pro Light" charset="0"/>
+              <a:cs typeface="Source Sans Pro Light" charset="0"/>
+            </a:endParaRPr>
           </a:p>
         </p:txBody>
       </p:sp>
@@ -4181,7 +4233,7 @@
         </p:nvSpPr>
         <p:spPr>
           <a:xfrm>
-            <a:off x="6104339" y="5819536"/>
+            <a:off x="6104339" y="5828414"/>
             <a:ext cx="1622983" cy="462963"/>
           </a:xfrm>
           <a:prstGeom prst="roundRect">
@@ -4240,49 +4292,11 @@
                 <a:ea typeface="Source Sans Pro Light" charset="0"/>
                 <a:cs typeface="Source Sans Pro Light" charset="0"/>
               </a:rPr>
-              <a:t>Program and test the application on the board</a:t>
-            </a:r>
-          </a:p>
-        </p:txBody>
-      </p:sp>
-      <p:cxnSp>
-        <p:nvCxnSpPr>
-          <p:cNvPr id="25" name="Straight Connector 24">
-            <a:extLst>
-              <a:ext uri="{FF2B5EF4-FFF2-40B4-BE49-F238E27FC236}">
-                <a16:creationId xmlns:a16="http://schemas.microsoft.com/office/drawing/2014/main" id="{DD32CB2C-7477-43B9-8989-D899C3F91A7B}"/>
-              </a:ext>
-            </a:extLst>
-          </p:cNvPr>
-          <p:cNvCxnSpPr>
-            <a:cxnSpLocks/>
-            <a:stCxn id="16" idx="0"/>
-            <a:endCxn id="7" idx="2"/>
-          </p:cNvCxnSpPr>
-          <p:nvPr/>
-        </p:nvCxnSpPr>
-        <p:spPr>
-          <a:xfrm flipV="1">
-            <a:off x="6915831" y="1639603"/>
-            <a:ext cx="0" cy="364754"/>
-          </a:xfrm>
-          <a:prstGeom prst="line">
-            <a:avLst/>
-          </a:prstGeom>
-          <a:noFill/>
-          <a:ln w="28575" cap="flat" cmpd="sng" algn="ctr">
-            <a:solidFill>
-              <a:srgbClr val="717D83">
-                <a:lumMod val="60000"/>
-                <a:lumOff val="40000"/>
-              </a:srgbClr>
-            </a:solidFill>
-            <a:prstDash val="solid"/>
-            <a:headEnd type="triangle"/>
-          </a:ln>
-          <a:effectLst/>
-        </p:spPr>
-      </p:cxnSp>
+              <a:t>Deploy and Run the Executable on the device</a:t>
+            </a:r>
+          </a:p>
+        </p:txBody>
+      </p:sp>
       <p:cxnSp>
         <p:nvCxnSpPr>
           <p:cNvPr id="26" name="Straight Connector 25">
@@ -4301,8 +4315,8 @@
         </p:nvCxnSpPr>
         <p:spPr>
           <a:xfrm flipV="1">
-            <a:off x="6915831" y="2467320"/>
-            <a:ext cx="0" cy="364755"/>
+            <a:off x="6915831" y="2402741"/>
+            <a:ext cx="0" cy="438212"/>
           </a:xfrm>
           <a:prstGeom prst="line">
             <a:avLst/>
@@ -4339,7 +4353,7 @@
         </p:nvCxnSpPr>
         <p:spPr>
           <a:xfrm flipV="1">
-            <a:off x="6915831" y="3552075"/>
+            <a:off x="6915831" y="3560953"/>
             <a:ext cx="0" cy="361561"/>
           </a:xfrm>
           <a:prstGeom prst="line">
@@ -4377,7 +4391,7 @@
         </p:nvCxnSpPr>
         <p:spPr>
           <a:xfrm flipV="1">
-            <a:off x="6915759" y="4376599"/>
+            <a:off x="6915759" y="4385477"/>
             <a:ext cx="72" cy="365930"/>
           </a:xfrm>
           <a:prstGeom prst="line">
@@ -4415,7 +4429,7 @@
         </p:nvCxnSpPr>
         <p:spPr>
           <a:xfrm flipH="1" flipV="1">
-            <a:off x="6915759" y="5462529"/>
+            <a:off x="6915759" y="5471407"/>
             <a:ext cx="72" cy="357007"/>
           </a:xfrm>
           <a:prstGeom prst="line">
@@ -4447,17 +4461,19 @@
           <p:cNvCxnSpPr>
             <a:cxnSpLocks/>
             <a:stCxn id="10" idx="2"/>
-            <a:endCxn id="16" idx="1"/>
+            <a:endCxn id="16" idx="0"/>
           </p:cNvCxnSpPr>
           <p:nvPr/>
         </p:nvCxnSpPr>
         <p:spPr>
           <a:xfrm rot="16200000" flipH="1">
-            <a:off x="5320001" y="1451501"/>
-            <a:ext cx="596236" cy="972439"/>
+            <a:off x="6720937" y="1744884"/>
+            <a:ext cx="389716" cy="72"/>
           </a:xfrm>
-          <a:prstGeom prst="bentConnector2">
-            <a:avLst/>
+          <a:prstGeom prst="bentConnector3">
+            <a:avLst>
+              <a:gd name="adj1" fmla="val 50000"/>
+            </a:avLst>
           </a:prstGeom>
           <a:noFill/>
           <a:ln w="28575" cap="flat" cmpd="sng" algn="ctr">
@@ -4492,7 +4508,7 @@
         </p:nvCxnSpPr>
         <p:spPr>
           <a:xfrm rot="16200000" flipH="1">
-            <a:off x="5321598" y="3362376"/>
+            <a:off x="5321598" y="3371254"/>
             <a:ext cx="593043" cy="972439"/>
           </a:xfrm>
           <a:prstGeom prst="bentConnector2">
@@ -4531,7 +4547,7 @@
         </p:nvCxnSpPr>
         <p:spPr>
           <a:xfrm rot="5400000">
-            <a:off x="7917020" y="3362375"/>
+            <a:off x="7917020" y="3371253"/>
             <a:ext cx="593045" cy="972440"/>
           </a:xfrm>
           <a:prstGeom prst="bentConnector2">
@@ -4566,7 +4582,7 @@
         </p:nvSpPr>
         <p:spPr>
           <a:xfrm>
-            <a:off x="3036118" y="2328820"/>
+            <a:off x="4103893" y="2348977"/>
             <a:ext cx="1578882" cy="276999"/>
           </a:xfrm>
           <a:prstGeom prst="rect">
@@ -4600,23 +4616,6 @@
               <a:tabLst/>
               <a:defRPr/>
             </a:pPr>
-            <a:r>
-              <a:rPr kumimoji="0" lang="en-US" sz="1200" b="0" i="0" u="none" strike="noStrike" kern="0" cap="none" spc="0" normalizeH="0" baseline="0" noProof="0" dirty="0" err="1">
-                <a:ln>
-                  <a:noFill/>
-                </a:ln>
-                <a:solidFill>
-                  <a:srgbClr val="4B5357"/>
-                </a:solidFill>
-                <a:effectLst/>
-                <a:uLnTx/>
-                <a:uFillTx/>
-                <a:latin typeface="Source Sans Pro Light" charset="0"/>
-                <a:ea typeface="Source Sans Pro Light" charset="0"/>
-                <a:cs typeface="Source Sans Pro Light" charset="0"/>
-              </a:rPr>
-              <a:t>MicroEJ</a:t>
-            </a:r>
             <a:r>
               <a:rPr kumimoji="0" lang="en-US" sz="1200" b="0" i="0" u="none" strike="noStrike" kern="0" cap="none" spc="0" normalizeH="0" baseline="0" noProof="0" dirty="0">
                 <a:ln>
@@ -4632,7 +4631,7 @@
                 <a:ea typeface="Source Sans Pro Light" charset="0"/>
                 <a:cs typeface="Source Sans Pro Light" charset="0"/>
               </a:rPr>
-              <a:t> Workbench</a:t>
+              <a:t>MICROEJ SDK</a:t>
             </a:r>
           </a:p>
         </p:txBody>
@@ -4651,7 +4650,7 @@
         </p:nvSpPr>
         <p:spPr>
           <a:xfrm>
-            <a:off x="3328175" y="2657242"/>
+            <a:off x="4137133" y="2597268"/>
             <a:ext cx="994767" cy="276999"/>
           </a:xfrm>
           <a:prstGeom prst="rect">

</xml_diff>